<commit_message>
fixes get x-forwarded-for header
</commit_message>
<xml_diff>
--- a/logo.pptx
+++ b/logo.pptx
@@ -4273,10 +4273,10 @@
       </p:grpSpPr>
       <p:grpSp>
         <p:nvGrpSpPr>
-          <p:cNvPr id="4" name="Group 3">
-            <a:extLst>
-              <a:ext uri="{FF2B5EF4-FFF2-40B4-BE49-F238E27FC236}">
-                <a16:creationId xmlns:a16="http://schemas.microsoft.com/office/drawing/2014/main" id="{3F634E31-D801-BD4A-9130-D9538F8A4F84}"/>
+          <p:cNvPr id="14" name="Group 13">
+            <a:extLst>
+              <a:ext uri="{FF2B5EF4-FFF2-40B4-BE49-F238E27FC236}">
+                <a16:creationId xmlns:a16="http://schemas.microsoft.com/office/drawing/2014/main" id="{FFFE8EB2-8304-0049-ADD9-A6F478DE6847}"/>
               </a:ext>
             </a:extLst>
           </p:cNvPr>
@@ -4285,18 +4285,437 @@
         </p:nvGrpSpPr>
         <p:grpSpPr>
           <a:xfrm>
-            <a:off x="5283320" y="1208313"/>
-            <a:ext cx="5750086" cy="4381102"/>
-            <a:chOff x="2647828" y="806504"/>
-            <a:chExt cx="6896343" cy="5254457"/>
+            <a:off x="285023" y="1035940"/>
+            <a:ext cx="11621953" cy="4786119"/>
+            <a:chOff x="285023" y="1035940"/>
+            <a:chExt cx="11621953" cy="4786119"/>
           </a:xfrm>
         </p:grpSpPr>
+        <p:grpSp>
+          <p:nvGrpSpPr>
+            <p:cNvPr id="4" name="Group 3">
+              <a:extLst>
+                <a:ext uri="{FF2B5EF4-FFF2-40B4-BE49-F238E27FC236}">
+                  <a16:creationId xmlns:a16="http://schemas.microsoft.com/office/drawing/2014/main" id="{3F634E31-D801-BD4A-9130-D9538F8A4F84}"/>
+                </a:ext>
+              </a:extLst>
+            </p:cNvPr>
+            <p:cNvGrpSpPr/>
+            <p:nvPr/>
+          </p:nvGrpSpPr>
+          <p:grpSpPr>
+            <a:xfrm>
+              <a:off x="5283320" y="1208313"/>
+              <a:ext cx="5750086" cy="4381102"/>
+              <a:chOff x="2647828" y="806504"/>
+              <a:chExt cx="6896343" cy="5254457"/>
+            </a:xfrm>
+          </p:grpSpPr>
+          <p:sp>
+            <p:nvSpPr>
+              <p:cNvPr id="5" name="Rectangle 4">
+                <a:extLst>
+                  <a:ext uri="{FF2B5EF4-FFF2-40B4-BE49-F238E27FC236}">
+                    <a16:creationId xmlns:a16="http://schemas.microsoft.com/office/drawing/2014/main" id="{9B1A9FE2-30F1-8040-9706-6F68E83863DD}"/>
+                  </a:ext>
+                </a:extLst>
+              </p:cNvPr>
+              <p:cNvSpPr/>
+              <p:nvPr/>
+            </p:nvSpPr>
+            <p:spPr>
+              <a:xfrm>
+                <a:off x="5881323" y="1731927"/>
+                <a:ext cx="460022" cy="887610"/>
+              </a:xfrm>
+              <a:prstGeom prst="rect">
+                <a:avLst/>
+              </a:prstGeom>
+              <a:solidFill>
+                <a:schemeClr val="tx1"/>
+              </a:solidFill>
+              <a:ln>
+                <a:noFill/>
+              </a:ln>
+            </p:spPr>
+            <p:style>
+              <a:lnRef idx="2">
+                <a:schemeClr val="accent1">
+                  <a:shade val="50000"/>
+                </a:schemeClr>
+              </a:lnRef>
+              <a:fillRef idx="1">
+                <a:schemeClr val="accent1"/>
+              </a:fillRef>
+              <a:effectRef idx="0">
+                <a:schemeClr val="accent1"/>
+              </a:effectRef>
+              <a:fontRef idx="minor">
+                <a:schemeClr val="lt1"/>
+              </a:fontRef>
+            </p:style>
+            <p:txBody>
+              <a:bodyPr rtlCol="0" anchor="ctr"/>
+              <a:lstStyle/>
+              <a:p>
+                <a:pPr algn="ctr"/>
+                <a:endParaRPr lang="en-US"/>
+              </a:p>
+            </p:txBody>
+          </p:sp>
+          <p:sp>
+            <p:nvSpPr>
+              <p:cNvPr id="6" name="Freeform 5">
+                <a:extLst>
+                  <a:ext uri="{FF2B5EF4-FFF2-40B4-BE49-F238E27FC236}">
+                    <a16:creationId xmlns:a16="http://schemas.microsoft.com/office/drawing/2014/main" id="{B9A7FD09-3A39-2943-A23E-0DEF38E5D19F}"/>
+                  </a:ext>
+                </a:extLst>
+              </p:cNvPr>
+              <p:cNvSpPr/>
+              <p:nvPr/>
+            </p:nvSpPr>
+            <p:spPr>
+              <a:xfrm>
+                <a:off x="2647828" y="1731925"/>
+                <a:ext cx="6896343" cy="3435846"/>
+              </a:xfrm>
+              <a:custGeom>
+                <a:avLst/>
+                <a:gdLst>
+                  <a:gd name="connsiteX0" fmla="*/ 0 w 4487779"/>
+                  <a:gd name="connsiteY0" fmla="*/ 0 h 3128210"/>
+                  <a:gd name="connsiteX1" fmla="*/ 4487779 w 4487779"/>
+                  <a:gd name="connsiteY1" fmla="*/ 0 h 3128210"/>
+                  <a:gd name="connsiteX2" fmla="*/ 4487779 w 4487779"/>
+                  <a:gd name="connsiteY2" fmla="*/ 3128210 h 3128210"/>
+                  <a:gd name="connsiteX3" fmla="*/ 12032 w 4487779"/>
+                  <a:gd name="connsiteY3" fmla="*/ 3128210 h 3128210"/>
+                </a:gdLst>
+                <a:ahLst/>
+                <a:cxnLst>
+                  <a:cxn ang="0">
+                    <a:pos x="connsiteX0" y="connsiteY0"/>
+                  </a:cxn>
+                  <a:cxn ang="0">
+                    <a:pos x="connsiteX1" y="connsiteY1"/>
+                  </a:cxn>
+                  <a:cxn ang="0">
+                    <a:pos x="connsiteX2" y="connsiteY2"/>
+                  </a:cxn>
+                  <a:cxn ang="0">
+                    <a:pos x="connsiteX3" y="connsiteY3"/>
+                  </a:cxn>
+                </a:cxnLst>
+                <a:rect l="l" t="t" r="r" b="b"/>
+                <a:pathLst>
+                  <a:path w="4487779" h="3128210">
+                    <a:moveTo>
+                      <a:pt x="0" y="0"/>
+                    </a:moveTo>
+                    <a:lnTo>
+                      <a:pt x="4487779" y="0"/>
+                    </a:lnTo>
+                    <a:lnTo>
+                      <a:pt x="4487779" y="3128210"/>
+                    </a:lnTo>
+                    <a:lnTo>
+                      <a:pt x="12032" y="3128210"/>
+                    </a:lnTo>
+                  </a:path>
+                </a:pathLst>
+              </a:custGeom>
+              <a:noFill/>
+              <a:ln w="228600">
+                <a:solidFill>
+                  <a:schemeClr val="tx1"/>
+                </a:solidFill>
+              </a:ln>
+            </p:spPr>
+            <p:style>
+              <a:lnRef idx="2">
+                <a:schemeClr val="accent1">
+                  <a:shade val="50000"/>
+                </a:schemeClr>
+              </a:lnRef>
+              <a:fillRef idx="1">
+                <a:schemeClr val="accent1"/>
+              </a:fillRef>
+              <a:effectRef idx="0">
+                <a:schemeClr val="accent1"/>
+              </a:effectRef>
+              <a:fontRef idx="minor">
+                <a:schemeClr val="lt1"/>
+              </a:fontRef>
+            </p:style>
+            <p:txBody>
+              <a:bodyPr rtlCol="0" anchor="ctr"/>
+              <a:lstStyle/>
+              <a:p>
+                <a:pPr algn="ctr"/>
+                <a:endParaRPr lang="en-US" dirty="0"/>
+              </a:p>
+            </p:txBody>
+          </p:sp>
+          <p:sp>
+            <p:nvSpPr>
+              <p:cNvPr id="7" name="Rectangle 6">
+                <a:extLst>
+                  <a:ext uri="{FF2B5EF4-FFF2-40B4-BE49-F238E27FC236}">
+                    <a16:creationId xmlns:a16="http://schemas.microsoft.com/office/drawing/2014/main" id="{3E1229F4-FA2C-4841-A65F-A1861A437011}"/>
+                  </a:ext>
+                </a:extLst>
+              </p:cNvPr>
+              <p:cNvSpPr/>
+              <p:nvPr/>
+            </p:nvSpPr>
+            <p:spPr>
+              <a:xfrm>
+                <a:off x="3929723" y="2376467"/>
+                <a:ext cx="4332555" cy="2146761"/>
+              </a:xfrm>
+              <a:prstGeom prst="rect">
+                <a:avLst/>
+              </a:prstGeom>
+              <a:solidFill>
+                <a:schemeClr val="tx1"/>
+              </a:solidFill>
+              <a:ln>
+                <a:solidFill>
+                  <a:schemeClr val="tx1"/>
+                </a:solidFill>
+              </a:ln>
+            </p:spPr>
+            <p:style>
+              <a:lnRef idx="2">
+                <a:schemeClr val="accent1">
+                  <a:shade val="50000"/>
+                </a:schemeClr>
+              </a:lnRef>
+              <a:fillRef idx="1">
+                <a:schemeClr val="accent1"/>
+              </a:fillRef>
+              <a:effectRef idx="0">
+                <a:schemeClr val="accent1"/>
+              </a:effectRef>
+              <a:fontRef idx="minor">
+                <a:schemeClr val="lt1"/>
+              </a:fontRef>
+            </p:style>
+            <p:txBody>
+              <a:bodyPr rtlCol="0" anchor="ctr"/>
+              <a:lstStyle/>
+              <a:p>
+                <a:pPr algn="ctr"/>
+                <a:endParaRPr lang="en-US" dirty="0"/>
+              </a:p>
+            </p:txBody>
+          </p:sp>
+          <p:sp>
+            <p:nvSpPr>
+              <p:cNvPr id="8" name="Chord 7">
+                <a:extLst>
+                  <a:ext uri="{FF2B5EF4-FFF2-40B4-BE49-F238E27FC236}">
+                    <a16:creationId xmlns:a16="http://schemas.microsoft.com/office/drawing/2014/main" id="{0A94D616-3433-F94C-A42A-573F9C2CA9D9}"/>
+                  </a:ext>
+                </a:extLst>
+              </p:cNvPr>
+              <p:cNvSpPr/>
+              <p:nvPr/>
+            </p:nvSpPr>
+            <p:spPr>
+              <a:xfrm rot="7200000">
+                <a:off x="5432455" y="806504"/>
+                <a:ext cx="1327089" cy="1327089"/>
+              </a:xfrm>
+              <a:prstGeom prst="chord">
+                <a:avLst>
+                  <a:gd name="adj1" fmla="val 2700000"/>
+                  <a:gd name="adj2" fmla="val 15438896"/>
+                </a:avLst>
+              </a:prstGeom>
+              <a:solidFill>
+                <a:schemeClr val="tx1"/>
+              </a:solidFill>
+              <a:ln>
+                <a:noFill/>
+              </a:ln>
+            </p:spPr>
+            <p:style>
+              <a:lnRef idx="2">
+                <a:schemeClr val="accent1">
+                  <a:shade val="50000"/>
+                </a:schemeClr>
+              </a:lnRef>
+              <a:fillRef idx="1">
+                <a:schemeClr val="accent1"/>
+              </a:fillRef>
+              <a:effectRef idx="0">
+                <a:schemeClr val="accent1"/>
+              </a:effectRef>
+              <a:fontRef idx="minor">
+                <a:schemeClr val="lt1"/>
+              </a:fontRef>
+            </p:style>
+            <p:txBody>
+              <a:bodyPr rtlCol="0" anchor="ctr"/>
+              <a:lstStyle/>
+              <a:p>
+                <a:pPr algn="ctr"/>
+                <a:endParaRPr lang="en-US"/>
+              </a:p>
+            </p:txBody>
+          </p:sp>
+          <p:sp>
+            <p:nvSpPr>
+              <p:cNvPr id="9" name="Chord 8">
+                <a:extLst>
+                  <a:ext uri="{FF2B5EF4-FFF2-40B4-BE49-F238E27FC236}">
+                    <a16:creationId xmlns:a16="http://schemas.microsoft.com/office/drawing/2014/main" id="{4589F545-776F-6B48-8DE4-895CEE1F01C5}"/>
+                  </a:ext>
+                </a:extLst>
+              </p:cNvPr>
+              <p:cNvSpPr/>
+              <p:nvPr/>
+            </p:nvSpPr>
+            <p:spPr>
+              <a:xfrm rot="18000000">
+                <a:off x="5432455" y="4733872"/>
+                <a:ext cx="1327089" cy="1327089"/>
+              </a:xfrm>
+              <a:prstGeom prst="chord">
+                <a:avLst>
+                  <a:gd name="adj1" fmla="val 2700000"/>
+                  <a:gd name="adj2" fmla="val 15438896"/>
+                </a:avLst>
+              </a:prstGeom>
+              <a:solidFill>
+                <a:schemeClr val="tx1"/>
+              </a:solidFill>
+              <a:ln>
+                <a:noFill/>
+              </a:ln>
+            </p:spPr>
+            <p:style>
+              <a:lnRef idx="2">
+                <a:schemeClr val="accent1">
+                  <a:shade val="50000"/>
+                </a:schemeClr>
+              </a:lnRef>
+              <a:fillRef idx="1">
+                <a:schemeClr val="accent1"/>
+              </a:fillRef>
+              <a:effectRef idx="0">
+                <a:schemeClr val="accent1"/>
+              </a:effectRef>
+              <a:fontRef idx="minor">
+                <a:schemeClr val="lt1"/>
+              </a:fontRef>
+            </p:style>
+            <p:txBody>
+              <a:bodyPr rtlCol="0" anchor="ctr"/>
+              <a:lstStyle/>
+              <a:p>
+                <a:pPr algn="ctr"/>
+                <a:endParaRPr lang="en-US"/>
+              </a:p>
+            </p:txBody>
+          </p:sp>
+          <p:sp>
+            <p:nvSpPr>
+              <p:cNvPr id="10" name="Rectangle 9">
+                <a:extLst>
+                  <a:ext uri="{FF2B5EF4-FFF2-40B4-BE49-F238E27FC236}">
+                    <a16:creationId xmlns:a16="http://schemas.microsoft.com/office/drawing/2014/main" id="{1400DBB4-5E3B-9148-A040-0CDEA9DD5673}"/>
+                  </a:ext>
+                </a:extLst>
+              </p:cNvPr>
+              <p:cNvSpPr/>
+              <p:nvPr/>
+            </p:nvSpPr>
+            <p:spPr>
+              <a:xfrm>
+                <a:off x="5881323" y="4138178"/>
+                <a:ext cx="460022" cy="929121"/>
+              </a:xfrm>
+              <a:prstGeom prst="rect">
+                <a:avLst/>
+              </a:prstGeom>
+              <a:solidFill>
+                <a:schemeClr val="tx1"/>
+              </a:solidFill>
+              <a:ln>
+                <a:noFill/>
+              </a:ln>
+            </p:spPr>
+            <p:style>
+              <a:lnRef idx="2">
+                <a:schemeClr val="accent1">
+                  <a:shade val="50000"/>
+                </a:schemeClr>
+              </a:lnRef>
+              <a:fillRef idx="1">
+                <a:schemeClr val="accent1"/>
+              </a:fillRef>
+              <a:effectRef idx="0">
+                <a:schemeClr val="accent1"/>
+              </a:effectRef>
+              <a:fontRef idx="minor">
+                <a:schemeClr val="lt1"/>
+              </a:fontRef>
+            </p:style>
+            <p:txBody>
+              <a:bodyPr rtlCol="0" anchor="ctr"/>
+              <a:lstStyle/>
+              <a:p>
+                <a:pPr algn="ctr"/>
+                <a:endParaRPr lang="en-US"/>
+              </a:p>
+            </p:txBody>
+          </p:sp>
+        </p:grpSp>
         <p:sp>
           <p:nvSpPr>
-            <p:cNvPr id="5" name="Rectangle 4">
+            <p:cNvPr id="11" name="TextBox 10">
               <a:extLst>
                 <a:ext uri="{FF2B5EF4-FFF2-40B4-BE49-F238E27FC236}">
-                  <a16:creationId xmlns:a16="http://schemas.microsoft.com/office/drawing/2014/main" id="{9B1A9FE2-30F1-8040-9706-6F68E83863DD}"/>
+                  <a16:creationId xmlns:a16="http://schemas.microsoft.com/office/drawing/2014/main" id="{6BB6D41A-A96F-7244-92A8-F7C0BF0FD841}"/>
+                </a:ext>
+              </a:extLst>
+            </p:cNvPr>
+            <p:cNvSpPr txBox="1"/>
+            <p:nvPr/>
+          </p:nvSpPr>
+          <p:spPr>
+            <a:xfrm>
+              <a:off x="815116" y="2373316"/>
+              <a:ext cx="4353885" cy="1938992"/>
+            </a:xfrm>
+            <a:prstGeom prst="rect">
+              <a:avLst/>
+            </a:prstGeom>
+            <a:noFill/>
+          </p:spPr>
+          <p:txBody>
+            <a:bodyPr wrap="square" rtlCol="0">
+              <a:spAutoFit/>
+            </a:bodyPr>
+            <a:lstStyle/>
+            <a:p>
+              <a:r>
+                <a:rPr lang="en-US" sz="12000" b="1" dirty="0" err="1"/>
+                <a:t>tangd</a:t>
+              </a:r>
+              <a:endParaRPr lang="en-US" sz="12000" b="1" dirty="0"/>
+            </a:p>
+          </p:txBody>
+        </p:sp>
+        <p:sp>
+          <p:nvSpPr>
+            <p:cNvPr id="12" name="Left Bracket 11">
+              <a:extLst>
+                <a:ext uri="{FF2B5EF4-FFF2-40B4-BE49-F238E27FC236}">
+                  <a16:creationId xmlns:a16="http://schemas.microsoft.com/office/drawing/2014/main" id="{B92D2A8E-09CB-534E-BC63-CFC0B3181D2E}"/>
                 </a:ext>
               </a:extLst>
             </p:cNvPr>
@@ -4305,33 +4724,31 @@
           </p:nvSpPr>
           <p:spPr>
             <a:xfrm>
-              <a:off x="5881323" y="1731927"/>
-              <a:ext cx="460022" cy="887610"/>
+              <a:off x="285023" y="1208313"/>
+              <a:ext cx="677876" cy="4613746"/>
             </a:xfrm>
-            <a:prstGeom prst="rect">
+            <a:prstGeom prst="leftBracket">
               <a:avLst/>
             </a:prstGeom>
-            <a:solidFill>
-              <a:schemeClr val="tx1"/>
-            </a:solidFill>
-            <a:ln>
-              <a:noFill/>
+            <a:noFill/>
+            <a:ln w="406400">
+              <a:solidFill>
+                <a:schemeClr val="tx1"/>
+              </a:solidFill>
             </a:ln>
           </p:spPr>
           <p:style>
-            <a:lnRef idx="2">
-              <a:schemeClr val="accent1">
-                <a:shade val="50000"/>
-              </a:schemeClr>
+            <a:lnRef idx="1">
+              <a:schemeClr val="accent1"/>
             </a:lnRef>
-            <a:fillRef idx="1">
+            <a:fillRef idx="0">
               <a:schemeClr val="accent1"/>
             </a:fillRef>
             <a:effectRef idx="0">
               <a:schemeClr val="accent1"/>
             </a:effectRef>
             <a:fontRef idx="minor">
-              <a:schemeClr val="lt1"/>
+              <a:schemeClr val="tx1"/>
             </a:fontRef>
           </p:style>
           <p:txBody>
@@ -4339,16 +4756,16 @@
             <a:lstStyle/>
             <a:p>
               <a:pPr algn="ctr"/>
-              <a:endParaRPr lang="en-US"/>
+              <a:endParaRPr lang="en-US" sz="8000" dirty="0"/>
             </a:p>
           </p:txBody>
         </p:sp>
         <p:sp>
           <p:nvSpPr>
-            <p:cNvPr id="6" name="Freeform 5">
+            <p:cNvPr id="13" name="Left Bracket 12">
               <a:extLst>
                 <a:ext uri="{FF2B5EF4-FFF2-40B4-BE49-F238E27FC236}">
-                  <a16:creationId xmlns:a16="http://schemas.microsoft.com/office/drawing/2014/main" id="{B9A7FD09-3A39-2943-A23E-0DEF38E5D19F}"/>
+                  <a16:creationId xmlns:a16="http://schemas.microsoft.com/office/drawing/2014/main" id="{14B0A3C6-6435-A649-BBCB-5525AB2405FC}"/>
                 </a:ext>
               </a:extLst>
             </p:cNvPr>
@@ -4356,76 +4773,32 @@
             <p:nvPr/>
           </p:nvSpPr>
           <p:spPr>
-            <a:xfrm>
-              <a:off x="2647828" y="1731925"/>
-              <a:ext cx="6896343" cy="3435846"/>
+            <a:xfrm rot="10800000">
+              <a:off x="11229100" y="1035940"/>
+              <a:ext cx="677876" cy="4613746"/>
             </a:xfrm>
-            <a:custGeom>
+            <a:prstGeom prst="leftBracket">
               <a:avLst/>
-              <a:gdLst>
-                <a:gd name="connsiteX0" fmla="*/ 0 w 4487779"/>
-                <a:gd name="connsiteY0" fmla="*/ 0 h 3128210"/>
-                <a:gd name="connsiteX1" fmla="*/ 4487779 w 4487779"/>
-                <a:gd name="connsiteY1" fmla="*/ 0 h 3128210"/>
-                <a:gd name="connsiteX2" fmla="*/ 4487779 w 4487779"/>
-                <a:gd name="connsiteY2" fmla="*/ 3128210 h 3128210"/>
-                <a:gd name="connsiteX3" fmla="*/ 12032 w 4487779"/>
-                <a:gd name="connsiteY3" fmla="*/ 3128210 h 3128210"/>
-              </a:gdLst>
-              <a:ahLst/>
-              <a:cxnLst>
-                <a:cxn ang="0">
-                  <a:pos x="connsiteX0" y="connsiteY0"/>
-                </a:cxn>
-                <a:cxn ang="0">
-                  <a:pos x="connsiteX1" y="connsiteY1"/>
-                </a:cxn>
-                <a:cxn ang="0">
-                  <a:pos x="connsiteX2" y="connsiteY2"/>
-                </a:cxn>
-                <a:cxn ang="0">
-                  <a:pos x="connsiteX3" y="connsiteY3"/>
-                </a:cxn>
-              </a:cxnLst>
-              <a:rect l="l" t="t" r="r" b="b"/>
-              <a:pathLst>
-                <a:path w="4487779" h="3128210">
-                  <a:moveTo>
-                    <a:pt x="0" y="0"/>
-                  </a:moveTo>
-                  <a:lnTo>
-                    <a:pt x="4487779" y="0"/>
-                  </a:lnTo>
-                  <a:lnTo>
-                    <a:pt x="4487779" y="3128210"/>
-                  </a:lnTo>
-                  <a:lnTo>
-                    <a:pt x="12032" y="3128210"/>
-                  </a:lnTo>
-                </a:path>
-              </a:pathLst>
-            </a:custGeom>
+            </a:prstGeom>
             <a:noFill/>
-            <a:ln w="228600">
+            <a:ln w="406400">
               <a:solidFill>
                 <a:schemeClr val="tx1"/>
               </a:solidFill>
             </a:ln>
           </p:spPr>
           <p:style>
-            <a:lnRef idx="2">
-              <a:schemeClr val="accent1">
-                <a:shade val="50000"/>
-              </a:schemeClr>
+            <a:lnRef idx="1">
+              <a:schemeClr val="accent1"/>
             </a:lnRef>
-            <a:fillRef idx="1">
+            <a:fillRef idx="0">
               <a:schemeClr val="accent1"/>
             </a:fillRef>
             <a:effectRef idx="0">
               <a:schemeClr val="accent1"/>
             </a:effectRef>
             <a:fontRef idx="minor">
-              <a:schemeClr val="lt1"/>
+              <a:schemeClr val="tx1"/>
             </a:fontRef>
           </p:style>
           <p:txBody>
@@ -4433,363 +4806,11 @@
             <a:lstStyle/>
             <a:p>
               <a:pPr algn="ctr"/>
-              <a:endParaRPr lang="en-US" dirty="0"/>
-            </a:p>
-          </p:txBody>
-        </p:sp>
-        <p:sp>
-          <p:nvSpPr>
-            <p:cNvPr id="7" name="Rectangle 6">
-              <a:extLst>
-                <a:ext uri="{FF2B5EF4-FFF2-40B4-BE49-F238E27FC236}">
-                  <a16:creationId xmlns:a16="http://schemas.microsoft.com/office/drawing/2014/main" id="{3E1229F4-FA2C-4841-A65F-A1861A437011}"/>
-                </a:ext>
-              </a:extLst>
-            </p:cNvPr>
-            <p:cNvSpPr/>
-            <p:nvPr/>
-          </p:nvSpPr>
-          <p:spPr>
-            <a:xfrm>
-              <a:off x="3929723" y="2376467"/>
-              <a:ext cx="4332555" cy="2146761"/>
-            </a:xfrm>
-            <a:prstGeom prst="rect">
-              <a:avLst/>
-            </a:prstGeom>
-            <a:solidFill>
-              <a:schemeClr val="tx1"/>
-            </a:solidFill>
-            <a:ln>
-              <a:solidFill>
-                <a:schemeClr val="tx1"/>
-              </a:solidFill>
-            </a:ln>
-          </p:spPr>
-          <p:style>
-            <a:lnRef idx="2">
-              <a:schemeClr val="accent1">
-                <a:shade val="50000"/>
-              </a:schemeClr>
-            </a:lnRef>
-            <a:fillRef idx="1">
-              <a:schemeClr val="accent1"/>
-            </a:fillRef>
-            <a:effectRef idx="0">
-              <a:schemeClr val="accent1"/>
-            </a:effectRef>
-            <a:fontRef idx="minor">
-              <a:schemeClr val="lt1"/>
-            </a:fontRef>
-          </p:style>
-          <p:txBody>
-            <a:bodyPr rtlCol="0" anchor="ctr"/>
-            <a:lstStyle/>
-            <a:p>
-              <a:pPr algn="ctr"/>
-              <a:endParaRPr lang="en-US" dirty="0"/>
-            </a:p>
-          </p:txBody>
-        </p:sp>
-        <p:sp>
-          <p:nvSpPr>
-            <p:cNvPr id="8" name="Chord 7">
-              <a:extLst>
-                <a:ext uri="{FF2B5EF4-FFF2-40B4-BE49-F238E27FC236}">
-                  <a16:creationId xmlns:a16="http://schemas.microsoft.com/office/drawing/2014/main" id="{0A94D616-3433-F94C-A42A-573F9C2CA9D9}"/>
-                </a:ext>
-              </a:extLst>
-            </p:cNvPr>
-            <p:cNvSpPr/>
-            <p:nvPr/>
-          </p:nvSpPr>
-          <p:spPr>
-            <a:xfrm rot="7200000">
-              <a:off x="5432455" y="806504"/>
-              <a:ext cx="1327089" cy="1327089"/>
-            </a:xfrm>
-            <a:prstGeom prst="chord">
-              <a:avLst>
-                <a:gd name="adj1" fmla="val 2700000"/>
-                <a:gd name="adj2" fmla="val 15438896"/>
-              </a:avLst>
-            </a:prstGeom>
-            <a:solidFill>
-              <a:schemeClr val="tx1"/>
-            </a:solidFill>
-            <a:ln>
-              <a:noFill/>
-            </a:ln>
-          </p:spPr>
-          <p:style>
-            <a:lnRef idx="2">
-              <a:schemeClr val="accent1">
-                <a:shade val="50000"/>
-              </a:schemeClr>
-            </a:lnRef>
-            <a:fillRef idx="1">
-              <a:schemeClr val="accent1"/>
-            </a:fillRef>
-            <a:effectRef idx="0">
-              <a:schemeClr val="accent1"/>
-            </a:effectRef>
-            <a:fontRef idx="minor">
-              <a:schemeClr val="lt1"/>
-            </a:fontRef>
-          </p:style>
-          <p:txBody>
-            <a:bodyPr rtlCol="0" anchor="ctr"/>
-            <a:lstStyle/>
-            <a:p>
-              <a:pPr algn="ctr"/>
-              <a:endParaRPr lang="en-US"/>
-            </a:p>
-          </p:txBody>
-        </p:sp>
-        <p:sp>
-          <p:nvSpPr>
-            <p:cNvPr id="9" name="Chord 8">
-              <a:extLst>
-                <a:ext uri="{FF2B5EF4-FFF2-40B4-BE49-F238E27FC236}">
-                  <a16:creationId xmlns:a16="http://schemas.microsoft.com/office/drawing/2014/main" id="{4589F545-776F-6B48-8DE4-895CEE1F01C5}"/>
-                </a:ext>
-              </a:extLst>
-            </p:cNvPr>
-            <p:cNvSpPr/>
-            <p:nvPr/>
-          </p:nvSpPr>
-          <p:spPr>
-            <a:xfrm rot="18000000">
-              <a:off x="5432455" y="4733872"/>
-              <a:ext cx="1327089" cy="1327089"/>
-            </a:xfrm>
-            <a:prstGeom prst="chord">
-              <a:avLst>
-                <a:gd name="adj1" fmla="val 2700000"/>
-                <a:gd name="adj2" fmla="val 15438896"/>
-              </a:avLst>
-            </a:prstGeom>
-            <a:solidFill>
-              <a:schemeClr val="tx1"/>
-            </a:solidFill>
-            <a:ln>
-              <a:noFill/>
-            </a:ln>
-          </p:spPr>
-          <p:style>
-            <a:lnRef idx="2">
-              <a:schemeClr val="accent1">
-                <a:shade val="50000"/>
-              </a:schemeClr>
-            </a:lnRef>
-            <a:fillRef idx="1">
-              <a:schemeClr val="accent1"/>
-            </a:fillRef>
-            <a:effectRef idx="0">
-              <a:schemeClr val="accent1"/>
-            </a:effectRef>
-            <a:fontRef idx="minor">
-              <a:schemeClr val="lt1"/>
-            </a:fontRef>
-          </p:style>
-          <p:txBody>
-            <a:bodyPr rtlCol="0" anchor="ctr"/>
-            <a:lstStyle/>
-            <a:p>
-              <a:pPr algn="ctr"/>
-              <a:endParaRPr lang="en-US"/>
-            </a:p>
-          </p:txBody>
-        </p:sp>
-        <p:sp>
-          <p:nvSpPr>
-            <p:cNvPr id="10" name="Rectangle 9">
-              <a:extLst>
-                <a:ext uri="{FF2B5EF4-FFF2-40B4-BE49-F238E27FC236}">
-                  <a16:creationId xmlns:a16="http://schemas.microsoft.com/office/drawing/2014/main" id="{1400DBB4-5E3B-9148-A040-0CDEA9DD5673}"/>
-                </a:ext>
-              </a:extLst>
-            </p:cNvPr>
-            <p:cNvSpPr/>
-            <p:nvPr/>
-          </p:nvSpPr>
-          <p:spPr>
-            <a:xfrm>
-              <a:off x="5881323" y="4138178"/>
-              <a:ext cx="460022" cy="929121"/>
-            </a:xfrm>
-            <a:prstGeom prst="rect">
-              <a:avLst/>
-            </a:prstGeom>
-            <a:solidFill>
-              <a:schemeClr val="tx1"/>
-            </a:solidFill>
-            <a:ln>
-              <a:noFill/>
-            </a:ln>
-          </p:spPr>
-          <p:style>
-            <a:lnRef idx="2">
-              <a:schemeClr val="accent1">
-                <a:shade val="50000"/>
-              </a:schemeClr>
-            </a:lnRef>
-            <a:fillRef idx="1">
-              <a:schemeClr val="accent1"/>
-            </a:fillRef>
-            <a:effectRef idx="0">
-              <a:schemeClr val="accent1"/>
-            </a:effectRef>
-            <a:fontRef idx="minor">
-              <a:schemeClr val="lt1"/>
-            </a:fontRef>
-          </p:style>
-          <p:txBody>
-            <a:bodyPr rtlCol="0" anchor="ctr"/>
-            <a:lstStyle/>
-            <a:p>
-              <a:pPr algn="ctr"/>
-              <a:endParaRPr lang="en-US"/>
+              <a:endParaRPr lang="en-US" sz="8000" dirty="0"/>
             </a:p>
           </p:txBody>
         </p:sp>
       </p:grpSp>
-      <p:sp>
-        <p:nvSpPr>
-          <p:cNvPr id="11" name="TextBox 10">
-            <a:extLst>
-              <a:ext uri="{FF2B5EF4-FFF2-40B4-BE49-F238E27FC236}">
-                <a16:creationId xmlns:a16="http://schemas.microsoft.com/office/drawing/2014/main" id="{6BB6D41A-A96F-7244-92A8-F7C0BF0FD841}"/>
-              </a:ext>
-            </a:extLst>
-          </p:cNvPr>
-          <p:cNvSpPr txBox="1"/>
-          <p:nvPr/>
-        </p:nvSpPr>
-        <p:spPr>
-          <a:xfrm>
-            <a:off x="815116" y="2373316"/>
-            <a:ext cx="4353885" cy="1938992"/>
-          </a:xfrm>
-          <a:prstGeom prst="rect">
-            <a:avLst/>
-          </a:prstGeom>
-          <a:noFill/>
-        </p:spPr>
-        <p:txBody>
-          <a:bodyPr wrap="square" rtlCol="0">
-            <a:spAutoFit/>
-          </a:bodyPr>
-          <a:lstStyle/>
-          <a:p>
-            <a:r>
-              <a:rPr lang="en-US" sz="12000" b="1" dirty="0" err="1"/>
-              <a:t>tangd</a:t>
-            </a:r>
-            <a:endParaRPr lang="en-US" sz="12000" b="1" dirty="0"/>
-          </a:p>
-        </p:txBody>
-      </p:sp>
-      <p:sp>
-        <p:nvSpPr>
-          <p:cNvPr id="12" name="Left Bracket 11">
-            <a:extLst>
-              <a:ext uri="{FF2B5EF4-FFF2-40B4-BE49-F238E27FC236}">
-                <a16:creationId xmlns:a16="http://schemas.microsoft.com/office/drawing/2014/main" id="{B92D2A8E-09CB-534E-BC63-CFC0B3181D2E}"/>
-              </a:ext>
-            </a:extLst>
-          </p:cNvPr>
-          <p:cNvSpPr/>
-          <p:nvPr/>
-        </p:nvSpPr>
-        <p:spPr>
-          <a:xfrm>
-            <a:off x="285023" y="1208313"/>
-            <a:ext cx="677876" cy="4613746"/>
-          </a:xfrm>
-          <a:prstGeom prst="leftBracket">
-            <a:avLst/>
-          </a:prstGeom>
-          <a:noFill/>
-          <a:ln w="406400">
-            <a:solidFill>
-              <a:schemeClr val="tx1"/>
-            </a:solidFill>
-          </a:ln>
-        </p:spPr>
-        <p:style>
-          <a:lnRef idx="1">
-            <a:schemeClr val="accent1"/>
-          </a:lnRef>
-          <a:fillRef idx="0">
-            <a:schemeClr val="accent1"/>
-          </a:fillRef>
-          <a:effectRef idx="0">
-            <a:schemeClr val="accent1"/>
-          </a:effectRef>
-          <a:fontRef idx="minor">
-            <a:schemeClr val="tx1"/>
-          </a:fontRef>
-        </p:style>
-        <p:txBody>
-          <a:bodyPr rtlCol="0" anchor="ctr"/>
-          <a:lstStyle/>
-          <a:p>
-            <a:pPr algn="ctr"/>
-            <a:endParaRPr lang="en-US" sz="8000" dirty="0"/>
-          </a:p>
-        </p:txBody>
-      </p:sp>
-      <p:sp>
-        <p:nvSpPr>
-          <p:cNvPr id="13" name="Left Bracket 12">
-            <a:extLst>
-              <a:ext uri="{FF2B5EF4-FFF2-40B4-BE49-F238E27FC236}">
-                <a16:creationId xmlns:a16="http://schemas.microsoft.com/office/drawing/2014/main" id="{14B0A3C6-6435-A649-BBCB-5525AB2405FC}"/>
-              </a:ext>
-            </a:extLst>
-          </p:cNvPr>
-          <p:cNvSpPr/>
-          <p:nvPr/>
-        </p:nvSpPr>
-        <p:spPr>
-          <a:xfrm rot="10800000">
-            <a:off x="11229100" y="1035940"/>
-            <a:ext cx="677876" cy="4613746"/>
-          </a:xfrm>
-          <a:prstGeom prst="leftBracket">
-            <a:avLst/>
-          </a:prstGeom>
-          <a:noFill/>
-          <a:ln w="406400">
-            <a:solidFill>
-              <a:schemeClr val="tx1"/>
-            </a:solidFill>
-          </a:ln>
-        </p:spPr>
-        <p:style>
-          <a:lnRef idx="1">
-            <a:schemeClr val="accent1"/>
-          </a:lnRef>
-          <a:fillRef idx="0">
-            <a:schemeClr val="accent1"/>
-          </a:fillRef>
-          <a:effectRef idx="0">
-            <a:schemeClr val="accent1"/>
-          </a:effectRef>
-          <a:fontRef idx="minor">
-            <a:schemeClr val="tx1"/>
-          </a:fontRef>
-        </p:style>
-        <p:txBody>
-          <a:bodyPr rtlCol="0" anchor="ctr"/>
-          <a:lstStyle/>
-          <a:p>
-            <a:pPr algn="ctr"/>
-            <a:endParaRPr lang="en-US" sz="8000" dirty="0"/>
-          </a:p>
-        </p:txBody>
-      </p:sp>
     </p:spTree>
     <p:extLst>
       <p:ext uri="{BB962C8B-B14F-4D97-AF65-F5344CB8AC3E}">

</xml_diff>